<commit_message>
Changes some pictures on the docs,pptx
</commit_message>
<xml_diff>
--- a/ΤΕΛΙΚΗ ΠΑΡΟΥΣΙΑΣΗ.pptx
+++ b/ΤΕΛΙΚΗ ΠΑΡΟΥΣΙΑΣΗ.pptx
@@ -11,9 +11,10 @@
     <p:sldId id="261" r:id="rId5"/>
     <p:sldId id="262" r:id="rId6"/>
     <p:sldId id="264" r:id="rId7"/>
-    <p:sldId id="265" r:id="rId8"/>
-    <p:sldId id="263" r:id="rId9"/>
-    <p:sldId id="266" r:id="rId10"/>
+    <p:sldId id="267" r:id="rId8"/>
+    <p:sldId id="265" r:id="rId9"/>
+    <p:sldId id="263" r:id="rId10"/>
+    <p:sldId id="266" r:id="rId11"/>
   </p:sldIdLst>
   <p:sldSz cx="12192000" cy="6858000"/>
   <p:notesSz cx="6858000" cy="9144000"/>
@@ -112,6 +113,11 @@
       </a:defRPr>
     </a:lvl9pPr>
   </p:defaultTextStyle>
+  <p:extLst>
+    <p:ext uri="{EFAFB233-063F-42B5-8137-9DF3F51BA10A}">
+      <p15:sldGuideLst xmlns:p15="http://schemas.microsoft.com/office/powerpoint/2012/main"/>
+    </p:ext>
+  </p:extLst>
 </p:presentation>
 </file>
 
@@ -3566,6 +3572,145 @@
 </p:sld>
 </file>
 
+<file path=ppt/slides/slide10.xml><?xml version="1.0" encoding="utf-8"?>
+<p:sld xmlns:a="http://schemas.openxmlformats.org/drawingml/2006/main" xmlns:r="http://schemas.openxmlformats.org/officeDocument/2006/relationships" xmlns:p="http://schemas.openxmlformats.org/presentationml/2006/main">
+  <p:cSld>
+    <p:spTree>
+      <p:nvGrpSpPr>
+        <p:cNvPr id="1" name=""/>
+        <p:cNvGrpSpPr/>
+        <p:nvPr/>
+      </p:nvGrpSpPr>
+      <p:grpSpPr>
+        <a:xfrm>
+          <a:off x="0" y="0"/>
+          <a:ext cx="0" cy="0"/>
+          <a:chOff x="0" y="0"/>
+          <a:chExt cx="0" cy="0"/>
+        </a:xfrm>
+      </p:grpSpPr>
+      <p:sp>
+        <p:nvSpPr>
+          <p:cNvPr id="2" name="Τίτλος 1">
+            <a:extLst>
+              <a:ext uri="{FF2B5EF4-FFF2-40B4-BE49-F238E27FC236}">
+                <a16:creationId xmlns:a16="http://schemas.microsoft.com/office/drawing/2014/main" id="{5675E2E8-14F8-4738-B498-8CFF119392D1}"/>
+              </a:ext>
+            </a:extLst>
+          </p:cNvPr>
+          <p:cNvSpPr>
+            <a:spLocks noGrp="1"/>
+          </p:cNvSpPr>
+          <p:nvPr>
+            <p:ph type="title"/>
+          </p:nvPr>
+        </p:nvSpPr>
+        <p:spPr/>
+        <p:txBody>
+          <a:bodyPr/>
+          <a:lstStyle/>
+          <a:p>
+            <a:r>
+              <a:rPr lang="el-GR" u="sng" dirty="0"/>
+              <a:t>Σκοπός και ιδιότητες εφαρμογής</a:t>
+            </a:r>
+            <a:endParaRPr lang="en-US" dirty="0"/>
+          </a:p>
+        </p:txBody>
+      </p:sp>
+      <p:sp>
+        <p:nvSpPr>
+          <p:cNvPr id="3" name="Θέση περιεχομένου 2">
+            <a:extLst>
+              <a:ext uri="{FF2B5EF4-FFF2-40B4-BE49-F238E27FC236}">
+                <a16:creationId xmlns:a16="http://schemas.microsoft.com/office/drawing/2014/main" id="{1CEA8DDA-52F9-416B-8909-D213485CDD47}"/>
+              </a:ext>
+            </a:extLst>
+          </p:cNvPr>
+          <p:cNvSpPr>
+            <a:spLocks noGrp="1"/>
+          </p:cNvSpPr>
+          <p:nvPr>
+            <p:ph idx="1"/>
+          </p:nvPr>
+        </p:nvSpPr>
+        <p:spPr/>
+        <p:txBody>
+          <a:bodyPr/>
+          <a:lstStyle/>
+          <a:p>
+            <a:r>
+              <a:rPr lang="en-US" dirty="0"/>
+              <a:t>Administrator queries </a:t>
+            </a:r>
+            <a:r>
+              <a:rPr lang="el-GR" dirty="0"/>
+              <a:t>με την εισαγωγή κωδικού</a:t>
+            </a:r>
+            <a:endParaRPr lang="en-US" dirty="0"/>
+          </a:p>
+        </p:txBody>
+      </p:sp>
+      <p:pic>
+        <p:nvPicPr>
+          <p:cNvPr id="6" name="Εικόνα 5">
+            <a:extLst>
+              <a:ext uri="{FF2B5EF4-FFF2-40B4-BE49-F238E27FC236}">
+                <a16:creationId xmlns:a16="http://schemas.microsoft.com/office/drawing/2014/main" id="{FD39766E-386A-40C3-ADED-ACDA5AF00FAD}"/>
+              </a:ext>
+            </a:extLst>
+          </p:cNvPr>
+          <p:cNvPicPr/>
+          <p:nvPr/>
+        </p:nvPicPr>
+        <p:blipFill rotWithShape="1">
+          <a:blip r:embed="rId2"/>
+          <a:srcRect t="-1" b="55235"/>
+          <a:stretch/>
+        </p:blipFill>
+        <p:spPr bwMode="auto">
+          <a:xfrm>
+            <a:off x="2584489" y="2540424"/>
+            <a:ext cx="7023022" cy="2921739"/>
+          </a:xfrm>
+          <a:prstGeom prst="rect">
+            <a:avLst/>
+          </a:prstGeom>
+          <a:ln>
+            <a:noFill/>
+          </a:ln>
+          <a:extLst>
+            <a:ext uri="{53640926-AAD7-44D8-BBD7-CCE9431645EC}">
+              <a14:shadowObscured xmlns:a14="http://schemas.microsoft.com/office/drawing/2010/main"/>
+            </a:ext>
+          </a:extLst>
+        </p:spPr>
+      </p:pic>
+    </p:spTree>
+    <p:extLst>
+      <p:ext uri="{BB962C8B-B14F-4D97-AF65-F5344CB8AC3E}">
+        <p14:creationId xmlns:p14="http://schemas.microsoft.com/office/powerpoint/2010/main" val="3279910634"/>
+      </p:ext>
+    </p:extLst>
+  </p:cSld>
+  <p:clrMapOvr>
+    <a:masterClrMapping/>
+  </p:clrMapOvr>
+  <mc:AlternateContent xmlns:mc="http://schemas.openxmlformats.org/markup-compatibility/2006" xmlns:p14="http://schemas.microsoft.com/office/powerpoint/2010/main">
+    <mc:Choice Requires="p14">
+      <p:transition spd="med" p14:dur="700">
+        <p:fade/>
+      </p:transition>
+    </mc:Choice>
+    <mc:Fallback xmlns="">
+      <p:transition spd="med">
+        <p:fade/>
+      </p:transition>
+    </mc:Fallback>
+  </mc:AlternateContent>
+</p:sld>
+</file>
+
 <file path=ppt/slides/slide2.xml><?xml version="1.0" encoding="utf-8"?>
 <p:sld xmlns:a="http://schemas.openxmlformats.org/drawingml/2006/main" xmlns:r="http://schemas.openxmlformats.org/officeDocument/2006/relationships" xmlns:p="http://schemas.openxmlformats.org/presentationml/2006/main">
   <p:cSld>
@@ -4128,7 +4273,12 @@
             <p:ph idx="1"/>
           </p:nvPr>
         </p:nvSpPr>
-        <p:spPr/>
+        <p:spPr>
+          <a:xfrm>
+            <a:off x="838200" y="1690688"/>
+            <a:ext cx="10515600" cy="4486275"/>
+          </a:xfrm>
+        </p:spPr>
         <p:txBody>
           <a:bodyPr/>
           <a:lstStyle/>
@@ -4153,74 +4303,40 @@
             <a:endParaRPr lang="el-GR" dirty="0"/>
           </a:p>
           <a:p>
+            <a:endParaRPr lang="en-US" dirty="0"/>
+          </a:p>
+          <a:p>
             <a:endParaRPr lang="el-GR" dirty="0"/>
-          </a:p>
-          <a:p>
-            <a:r>
-              <a:rPr lang="el-GR" dirty="0"/>
-              <a:t>Αναζήτηση πελατών με φίλτρα όπως το όνομα τους.</a:t>
-            </a:r>
-            <a:br>
-              <a:rPr lang="en-US" dirty="0"/>
-            </a:br>
-            <a:endParaRPr lang="en-US" dirty="0"/>
           </a:p>
         </p:txBody>
       </p:sp>
       <p:pic>
         <p:nvPicPr>
-          <p:cNvPr id="7" name="Εικόνα 6">
-            <a:extLst>
-              <a:ext uri="{FF2B5EF4-FFF2-40B4-BE49-F238E27FC236}">
-                <a16:creationId xmlns:a16="http://schemas.microsoft.com/office/drawing/2014/main" id="{96E44A31-4810-460B-905F-2020159CBB8C}"/>
-              </a:ext>
-            </a:extLst>
-          </p:cNvPr>
-          <p:cNvPicPr>
-            <a:picLocks noChangeAspect="1"/>
-          </p:cNvPicPr>
+          <p:cNvPr id="6" name="Εικόνα 5">
+            <a:extLst>
+              <a:ext uri="{FF2B5EF4-FFF2-40B4-BE49-F238E27FC236}">
+                <a16:creationId xmlns:a16="http://schemas.microsoft.com/office/drawing/2014/main" id="{16F2CE23-8E15-4A31-B777-F5B989591348}"/>
+              </a:ext>
+            </a:extLst>
+          </p:cNvPr>
+          <p:cNvPicPr/>
           <p:nvPr/>
         </p:nvPicPr>
-        <p:blipFill>
-          <a:blip r:embed="rId2"/>
-          <a:stretch>
-            <a:fillRect/>
-          </a:stretch>
+        <p:blipFill rotWithShape="1">
+          <a:blip r:embed="rId2">
+            <a:extLst>
+              <a:ext uri="{28A0092B-C50C-407E-A947-70E740481C1C}">
+                <a14:useLocalDpi xmlns:a14="http://schemas.microsoft.com/office/drawing/2010/main" val="0"/>
+              </a:ext>
+            </a:extLst>
+          </a:blip>
+          <a:srcRect b="14699"/>
+          <a:stretch/>
         </p:blipFill>
         <p:spPr>
           <a:xfrm>
-            <a:off x="1005396" y="2519362"/>
-            <a:ext cx="6414579" cy="1629235"/>
-          </a:xfrm>
-          <a:prstGeom prst="rect">
-            <a:avLst/>
-          </a:prstGeom>
-        </p:spPr>
-      </p:pic>
-      <p:pic>
-        <p:nvPicPr>
-          <p:cNvPr id="11" name="Εικόνα 10">
-            <a:extLst>
-              <a:ext uri="{FF2B5EF4-FFF2-40B4-BE49-F238E27FC236}">
-                <a16:creationId xmlns:a16="http://schemas.microsoft.com/office/drawing/2014/main" id="{AD2ABF5E-CA39-4F10-B2ED-00D550A8FDEA}"/>
-              </a:ext>
-            </a:extLst>
-          </p:cNvPr>
-          <p:cNvPicPr>
-            <a:picLocks noChangeAspect="1"/>
-          </p:cNvPicPr>
-          <p:nvPr/>
-        </p:nvPicPr>
-        <p:blipFill>
-          <a:blip r:embed="rId3"/>
-          <a:stretch>
-            <a:fillRect/>
-          </a:stretch>
-        </p:blipFill>
-        <p:spPr>
-          <a:xfrm>
-            <a:off x="1057783" y="4905375"/>
-            <a:ext cx="9103838" cy="1271588"/>
+            <a:off x="2904153" y="2496955"/>
+            <a:ext cx="6383694" cy="2873740"/>
           </a:xfrm>
           <a:prstGeom prst="rect">
             <a:avLst/>
@@ -4274,7 +4390,7 @@
           <p:cNvPr id="2" name="Τίτλος 1">
             <a:extLst>
               <a:ext uri="{FF2B5EF4-FFF2-40B4-BE49-F238E27FC236}">
-                <a16:creationId xmlns:a16="http://schemas.microsoft.com/office/drawing/2014/main" id="{8DB72978-F5F8-46C9-A9E1-2C48F6A06142}"/>
+                <a16:creationId xmlns:a16="http://schemas.microsoft.com/office/drawing/2014/main" id="{62FD891D-0D4B-4F43-8049-CB3070AACCD7}"/>
               </a:ext>
             </a:extLst>
           </p:cNvPr>
@@ -4303,7 +4419,7 @@
           <p:cNvPr id="3" name="Θέση περιεχομένου 2">
             <a:extLst>
               <a:ext uri="{FF2B5EF4-FFF2-40B4-BE49-F238E27FC236}">
-                <a16:creationId xmlns:a16="http://schemas.microsoft.com/office/drawing/2014/main" id="{45890C1E-3E38-421D-B874-2FB2CE3B0254}"/>
+                <a16:creationId xmlns:a16="http://schemas.microsoft.com/office/drawing/2014/main" id="{EE019530-97F7-454D-BB4A-D8106FC550AD}"/>
               </a:ext>
             </a:extLst>
           </p:cNvPr>
@@ -4314,17 +4430,22 @@
             <p:ph idx="1"/>
           </p:nvPr>
         </p:nvSpPr>
-        <p:spPr/>
+        <p:spPr>
+          <a:xfrm>
+            <a:off x="838200" y="1690688"/>
+            <a:ext cx="10515600" cy="4486275"/>
+          </a:xfrm>
+        </p:spPr>
         <p:txBody>
           <a:bodyPr/>
           <a:lstStyle/>
           <a:p>
             <a:r>
               <a:rPr lang="el-GR" dirty="0"/>
-              <a:t>Προσθήκη νέων πελατών</a:t>
+              <a:t>Αναζήτηση πελατών με φίλτρα όπως το όνομα τους.</a:t>
             </a:r>
             <a:br>
-              <a:rPr lang="el-GR" dirty="0"/>
+              <a:rPr lang="en-US" dirty="0"/>
             </a:br>
             <a:endParaRPr lang="en-US" dirty="0"/>
           </a:p>
@@ -4332,10 +4453,10 @@
       </p:sp>
       <p:pic>
         <p:nvPicPr>
-          <p:cNvPr id="7" name="Εικόνα 6">
-            <a:extLst>
-              <a:ext uri="{FF2B5EF4-FFF2-40B4-BE49-F238E27FC236}">
-                <a16:creationId xmlns:a16="http://schemas.microsoft.com/office/drawing/2014/main" id="{BF937C6C-AAAB-4131-8C49-CBC569575744}"/>
+          <p:cNvPr id="5" name="Εικόνα 4">
+            <a:extLst>
+              <a:ext uri="{FF2B5EF4-FFF2-40B4-BE49-F238E27FC236}">
+                <a16:creationId xmlns:a16="http://schemas.microsoft.com/office/drawing/2014/main" id="{3EBF6BCC-8E67-4384-A02A-0B4447D05C44}"/>
               </a:ext>
             </a:extLst>
           </p:cNvPr>
@@ -4344,16 +4465,15 @@
           </p:cNvPicPr>
           <p:nvPr/>
         </p:nvPicPr>
-        <p:blipFill>
+        <p:blipFill rotWithShape="1">
           <a:blip r:embed="rId2"/>
-          <a:stretch>
-            <a:fillRect/>
-          </a:stretch>
+          <a:srcRect l="1" t="214" r="-1" b="31360"/>
+          <a:stretch/>
         </p:blipFill>
         <p:spPr>
           <a:xfrm>
-            <a:off x="1788573" y="2519363"/>
-            <a:ext cx="7105650" cy="3657600"/>
+            <a:off x="3018544" y="2460679"/>
+            <a:ext cx="6154911" cy="2946292"/>
           </a:xfrm>
           <a:prstGeom prst="rect">
             <a:avLst/>
@@ -4363,7 +4483,7 @@
     </p:spTree>
     <p:extLst>
       <p:ext uri="{BB962C8B-B14F-4D97-AF65-F5344CB8AC3E}">
-        <p14:creationId xmlns:p14="http://schemas.microsoft.com/office/powerpoint/2010/main" val="1201581536"/>
+        <p14:creationId xmlns:p14="http://schemas.microsoft.com/office/powerpoint/2010/main" val="2963279597"/>
       </p:ext>
     </p:extLst>
   </p:cSld>
@@ -4407,7 +4527,7 @@
           <p:cNvPr id="2" name="Τίτλος 1">
             <a:extLst>
               <a:ext uri="{FF2B5EF4-FFF2-40B4-BE49-F238E27FC236}">
-                <a16:creationId xmlns:a16="http://schemas.microsoft.com/office/drawing/2014/main" id="{597896F1-AFB1-4596-8374-17CAD6FB56EF}"/>
+                <a16:creationId xmlns:a16="http://schemas.microsoft.com/office/drawing/2014/main" id="{8DB72978-F5F8-46C9-A9E1-2C48F6A06142}"/>
               </a:ext>
             </a:extLst>
           </p:cNvPr>
@@ -4436,7 +4556,7 @@
           <p:cNvPr id="3" name="Θέση περιεχομένου 2">
             <a:extLst>
               <a:ext uri="{FF2B5EF4-FFF2-40B4-BE49-F238E27FC236}">
-                <a16:creationId xmlns:a16="http://schemas.microsoft.com/office/drawing/2014/main" id="{E798E897-2DC9-4A9A-98D9-A54428E2FE72}"/>
+                <a16:creationId xmlns:a16="http://schemas.microsoft.com/office/drawing/2014/main" id="{45890C1E-3E38-421D-B874-2FB2CE3B0254}"/>
               </a:ext>
             </a:extLst>
           </p:cNvPr>
@@ -4454,47 +4574,21 @@
           <a:p>
             <a:r>
               <a:rPr lang="el-GR" dirty="0"/>
-              <a:t>Για τους υπεύθυνους:</a:t>
-            </a:r>
-          </a:p>
-          <a:p>
-            <a:pPr lvl="1"/>
-            <a:r>
+              <a:t>Προσθήκη νέων πελατών</a:t>
+            </a:r>
+            <a:br>
               <a:rPr lang="el-GR" dirty="0"/>
-              <a:t>Μπορούν να κάνουν ότι κάνουν και οι απλοί χρήστες.</a:t>
-            </a:r>
-          </a:p>
-          <a:p>
-            <a:pPr lvl="1"/>
-            <a:r>
-              <a:rPr lang="el-GR" dirty="0"/>
-              <a:t>Μπορούν να αναζητήσουν στοιχεία των υπαλλήλων, εξοπλισμού και των χώρων μέσω του παραθύρου </a:t>
-            </a:r>
-            <a:r>
-              <a:rPr lang="en-US" dirty="0" err="1"/>
-              <a:t>SQLwindow</a:t>
-            </a:r>
-            <a:r>
-              <a:rPr lang="en-US" dirty="0"/>
-              <a:t> </a:t>
-            </a:r>
-            <a:r>
-              <a:rPr lang="el-GR" dirty="0"/>
-              <a:t>με την εισαγωγή κάποιου κωδικού.</a:t>
-            </a:r>
-            <a:br>
-              <a:rPr lang="en-US" dirty="0"/>
             </a:br>
-            <a:endParaRPr lang="el-GR" dirty="0"/>
+            <a:endParaRPr lang="en-US" dirty="0"/>
           </a:p>
         </p:txBody>
       </p:sp>
       <p:pic>
         <p:nvPicPr>
-          <p:cNvPr id="5" name="Εικόνα 4">
-            <a:extLst>
-              <a:ext uri="{FF2B5EF4-FFF2-40B4-BE49-F238E27FC236}">
-                <a16:creationId xmlns:a16="http://schemas.microsoft.com/office/drawing/2014/main" id="{EB4A792C-C28E-440D-B4F0-8EC3841B3739}"/>
+          <p:cNvPr id="7" name="Εικόνα 6">
+            <a:extLst>
+              <a:ext uri="{FF2B5EF4-FFF2-40B4-BE49-F238E27FC236}">
+                <a16:creationId xmlns:a16="http://schemas.microsoft.com/office/drawing/2014/main" id="{BF937C6C-AAAB-4131-8C49-CBC569575744}"/>
               </a:ext>
             </a:extLst>
           </p:cNvPr>
@@ -4511,8 +4605,8 @@
         </p:blipFill>
         <p:spPr>
           <a:xfrm>
-            <a:off x="2323406" y="3642712"/>
-            <a:ext cx="7172325" cy="1809750"/>
+            <a:off x="2543175" y="2519363"/>
+            <a:ext cx="7105650" cy="3657600"/>
           </a:xfrm>
           <a:prstGeom prst="rect">
             <a:avLst/>
@@ -4522,7 +4616,7 @@
     </p:spTree>
     <p:extLst>
       <p:ext uri="{BB962C8B-B14F-4D97-AF65-F5344CB8AC3E}">
-        <p14:creationId xmlns:p14="http://schemas.microsoft.com/office/powerpoint/2010/main" val="1503144535"/>
+        <p14:creationId xmlns:p14="http://schemas.microsoft.com/office/powerpoint/2010/main" val="1201581536"/>
       </p:ext>
     </p:extLst>
   </p:cSld>
@@ -4566,7 +4660,7 @@
           <p:cNvPr id="2" name="Τίτλος 1">
             <a:extLst>
               <a:ext uri="{FF2B5EF4-FFF2-40B4-BE49-F238E27FC236}">
-                <a16:creationId xmlns:a16="http://schemas.microsoft.com/office/drawing/2014/main" id="{5675E2E8-14F8-4738-B498-8CFF119392D1}"/>
+                <a16:creationId xmlns:a16="http://schemas.microsoft.com/office/drawing/2014/main" id="{597896F1-AFB1-4596-8374-17CAD6FB56EF}"/>
               </a:ext>
             </a:extLst>
           </p:cNvPr>
@@ -4595,7 +4689,7 @@
           <p:cNvPr id="3" name="Θέση περιεχομένου 2">
             <a:extLst>
               <a:ext uri="{FF2B5EF4-FFF2-40B4-BE49-F238E27FC236}">
-                <a16:creationId xmlns:a16="http://schemas.microsoft.com/office/drawing/2014/main" id="{1CEA8DDA-52F9-416B-8909-D213485CDD47}"/>
+                <a16:creationId xmlns:a16="http://schemas.microsoft.com/office/drawing/2014/main" id="{E798E897-2DC9-4A9A-98D9-A54428E2FE72}"/>
               </a:ext>
             </a:extLst>
           </p:cNvPr>
@@ -4612,14 +4706,39 @@
           <a:lstStyle/>
           <a:p>
             <a:r>
+              <a:rPr lang="el-GR" dirty="0"/>
+              <a:t>Για τους υπεύθυνους:</a:t>
+            </a:r>
+          </a:p>
+          <a:p>
+            <a:pPr lvl="1"/>
+            <a:r>
+              <a:rPr lang="el-GR" dirty="0"/>
+              <a:t>Μπορούν να κάνουν ότι κάνουν και οι απλοί χρήστες.</a:t>
+            </a:r>
+          </a:p>
+          <a:p>
+            <a:pPr lvl="1"/>
+            <a:r>
+              <a:rPr lang="el-GR" dirty="0"/>
+              <a:t>Μπορούν να αναζητήσουν στοιχεία των υπαλλήλων, εξοπλισμού και των χώρων μέσω του παραθύρου </a:t>
+            </a:r>
+            <a:r>
+              <a:rPr lang="en-US" dirty="0" err="1"/>
+              <a:t>SQLwindow</a:t>
+            </a:r>
+            <a:r>
               <a:rPr lang="en-US" dirty="0"/>
-              <a:t>Administrator queries </a:t>
+              <a:t> </a:t>
             </a:r>
             <a:r>
               <a:rPr lang="el-GR" dirty="0"/>
-              <a:t>με την εισαγωγή κωδικού</a:t>
-            </a:r>
-            <a:endParaRPr lang="en-US" dirty="0"/>
+              <a:t>με την εισαγωγή κάποιου κωδικού.</a:t>
+            </a:r>
+            <a:br>
+              <a:rPr lang="en-US" dirty="0"/>
+            </a:br>
+            <a:endParaRPr lang="el-GR" dirty="0"/>
           </a:p>
         </p:txBody>
       </p:sp>
@@ -4628,7 +4747,7 @@
           <p:cNvPr id="5" name="Εικόνα 4">
             <a:extLst>
               <a:ext uri="{FF2B5EF4-FFF2-40B4-BE49-F238E27FC236}">
-                <a16:creationId xmlns:a16="http://schemas.microsoft.com/office/drawing/2014/main" id="{D637B85D-DBFA-44B9-86D4-1DD02159D791}"/>
+                <a16:creationId xmlns:a16="http://schemas.microsoft.com/office/drawing/2014/main" id="{EB4A792C-C28E-440D-B4F0-8EC3841B3739}"/>
               </a:ext>
             </a:extLst>
           </p:cNvPr>
@@ -4645,8 +4764,8 @@
         </p:blipFill>
         <p:spPr>
           <a:xfrm>
-            <a:off x="1503285" y="2356644"/>
-            <a:ext cx="7129001" cy="3289300"/>
+            <a:off x="2509837" y="3642712"/>
+            <a:ext cx="7172325" cy="1809750"/>
           </a:xfrm>
           <a:prstGeom prst="rect">
             <a:avLst/>
@@ -4656,7 +4775,7 @@
     </p:spTree>
     <p:extLst>
       <p:ext uri="{BB962C8B-B14F-4D97-AF65-F5344CB8AC3E}">
-        <p14:creationId xmlns:p14="http://schemas.microsoft.com/office/powerpoint/2010/main" val="3279910634"/>
+        <p14:creationId xmlns:p14="http://schemas.microsoft.com/office/powerpoint/2010/main" val="1503144535"/>
       </p:ext>
     </p:extLst>
   </p:cSld>

</xml_diff>